<commit_message>
fixed some typos in readme and pdf
</commit_message>
<xml_diff>
--- a/Sport Wear Group Analytics.pptx
+++ b/Sport Wear Group Analytics.pptx
@@ -397,7 +397,7 @@
           <a:p>
             <a:fld id="{6EE7A52F-9D89-7442-A8E9-48D1527B5F6B}" type="datetimeFigureOut">
               <a:rPr lang="en-US" smtClean="0"/>
-              <a:t>1/2/2024</a:t>
+              <a:t>1/7/2024</a:t>
             </a:fld>
             <a:endParaRPr lang="en-US" dirty="0"/>
           </a:p>
@@ -12411,7 +12411,7 @@
             <a:fld id="{6FCA8E82-58CD-E045-8B98-B7A85B79B752}" type="datetime4">
               <a:rPr lang="en-US" smtClean="0"/>
               <a:pPr/>
-              <a:t>January 2, 2024</a:t>
+              <a:t>January 7, 2024</a:t>
             </a:fld>
             <a:endParaRPr lang="en-US" dirty="0">
               <a:latin typeface="+mn-lt"/>
@@ -13328,7 +13328,7 @@
             <a:fld id="{6FCA8E82-58CD-E045-8B98-B7A85B79B752}" type="datetime4">
               <a:rPr lang="en-US" smtClean="0"/>
               <a:pPr/>
-              <a:t>January 2, 2024</a:t>
+              <a:t>January 7, 2024</a:t>
             </a:fld>
             <a:endParaRPr lang="en-US" dirty="0"/>
           </a:p>
@@ -13727,7 +13727,7 @@
             <a:fld id="{6FCA8E82-58CD-E045-8B98-B7A85B79B752}" type="datetime4">
               <a:rPr lang="en-US" smtClean="0"/>
               <a:pPr/>
-              <a:t>January 2, 2024</a:t>
+              <a:t>January 7, 2024</a:t>
             </a:fld>
             <a:endParaRPr lang="en-US" dirty="0"/>
           </a:p>
@@ -14133,7 +14133,7 @@
             <a:fld id="{6FCA8E82-58CD-E045-8B98-B7A85B79B752}" type="datetime4">
               <a:rPr lang="en-US" smtClean="0"/>
               <a:pPr/>
-              <a:t>January 2, 2024</a:t>
+              <a:t>January 7, 2024</a:t>
             </a:fld>
             <a:endParaRPr lang="en-US" dirty="0"/>
           </a:p>
@@ -14521,7 +14521,7 @@
             <a:fld id="{6FCA8E82-58CD-E045-8B98-B7A85B79B752}" type="datetime4">
               <a:rPr lang="en-US" smtClean="0"/>
               <a:pPr/>
-              <a:t>January 2, 2024</a:t>
+              <a:t>January 7, 2024</a:t>
             </a:fld>
             <a:endParaRPr lang="en-US" dirty="0"/>
           </a:p>
@@ -14867,7 +14867,7 @@
             <a:fld id="{6FCA8E82-58CD-E045-8B98-B7A85B79B752}" type="datetime4">
               <a:rPr lang="en-US" smtClean="0"/>
               <a:pPr/>
-              <a:t>January 2, 2024</a:t>
+              <a:t>January 7, 2024</a:t>
             </a:fld>
             <a:endParaRPr lang="en-US" dirty="0"/>
           </a:p>
@@ -15213,7 +15213,7 @@
             <a:fld id="{6FCA8E82-58CD-E045-8B98-B7A85B79B752}" type="datetime4">
               <a:rPr lang="en-US" smtClean="0"/>
               <a:pPr/>
-              <a:t>January 2, 2024</a:t>
+              <a:t>January 7, 2024</a:t>
             </a:fld>
             <a:endParaRPr lang="en-US" dirty="0"/>
           </a:p>
@@ -15559,7 +15559,7 @@
             <a:fld id="{6FCA8E82-58CD-E045-8B98-B7A85B79B752}" type="datetime4">
               <a:rPr lang="en-US" smtClean="0"/>
               <a:pPr/>
-              <a:t>January 2, 2024</a:t>
+              <a:t>January 7, 2024</a:t>
             </a:fld>
             <a:endParaRPr lang="en-US" dirty="0"/>
           </a:p>
@@ -15909,7 +15909,7 @@
           <a:p>
             <a:r>
               <a:rPr lang="en-US" dirty="0"/>
-              <a:t>- Also, It is better to </a:t>
+              <a:t>- Also, It is better to drop </a:t>
             </a:r>
             <a:r>
               <a:rPr lang="en-US" b="1" dirty="0"/>
@@ -16460,7 +16460,7 @@
             <a:fld id="{6FCA8E82-58CD-E045-8B98-B7A85B79B752}" type="datetime4">
               <a:rPr lang="en-US" smtClean="0"/>
               <a:pPr/>
-              <a:t>January 2, 2024</a:t>
+              <a:t>January 7, 2024</a:t>
             </a:fld>
             <a:endParaRPr lang="en-US" dirty="0"/>
           </a:p>
@@ -16759,7 +16759,7 @@
             <a:fld id="{6FCA8E82-58CD-E045-8B98-B7A85B79B752}" type="datetime4">
               <a:rPr lang="en-US" smtClean="0"/>
               <a:pPr/>
-              <a:t>January 2, 2024</a:t>
+              <a:t>January 7, 2024</a:t>
             </a:fld>
             <a:endParaRPr lang="en-US" dirty="0"/>
           </a:p>
@@ -17102,7 +17102,7 @@
             <a:fld id="{6FCA8E82-58CD-E045-8B98-B7A85B79B752}" type="datetime4">
               <a:rPr lang="en-US" smtClean="0"/>
               <a:pPr/>
-              <a:t>January 2, 2024</a:t>
+              <a:t>January 7, 2024</a:t>
             </a:fld>
             <a:endParaRPr lang="en-US" dirty="0"/>
           </a:p>
@@ -17691,7 +17691,7 @@
             <a:fld id="{6FCA8E82-58CD-E045-8B98-B7A85B79B752}" type="datetime4">
               <a:rPr lang="en-US" smtClean="0"/>
               <a:pPr/>
-              <a:t>January 2, 2024</a:t>
+              <a:t>January 7, 2024</a:t>
             </a:fld>
             <a:endParaRPr lang="en-US" dirty="0"/>
           </a:p>
@@ -17987,7 +17987,7 @@
             <a:fld id="{6FCA8E82-58CD-E045-8B98-B7A85B79B752}" type="datetime4">
               <a:rPr lang="en-US" smtClean="0"/>
               <a:pPr/>
-              <a:t>January 2, 2024</a:t>
+              <a:t>January 7, 2024</a:t>
             </a:fld>
             <a:endParaRPr lang="en-US" dirty="0"/>
           </a:p>
@@ -18788,7 +18788,7 @@
             <a:fld id="{6FCA8E82-58CD-E045-8B98-B7A85B79B752}" type="datetime4">
               <a:rPr lang="en-US" smtClean="0"/>
               <a:pPr/>
-              <a:t>January 2, 2024</a:t>
+              <a:t>January 7, 2024</a:t>
             </a:fld>
             <a:endParaRPr lang="en-US" dirty="0"/>
           </a:p>
@@ -19201,7 +19201,7 @@
             <a:fld id="{6FCA8E82-58CD-E045-8B98-B7A85B79B752}" type="datetime4">
               <a:rPr lang="en-US" smtClean="0"/>
               <a:pPr/>
-              <a:t>January 2, 2024</a:t>
+              <a:t>January 7, 2024</a:t>
             </a:fld>
             <a:endParaRPr lang="en-US" dirty="0"/>
           </a:p>
@@ -19739,7 +19739,7 @@
             <a:fld id="{6FCA8E82-58CD-E045-8B98-B7A85B79B752}" type="datetime4">
               <a:rPr lang="en-US" smtClean="0"/>
               <a:pPr/>
-              <a:t>January 2, 2024</a:t>
+              <a:t>January 7, 2024</a:t>
             </a:fld>
             <a:endParaRPr lang="en-US" dirty="0"/>
           </a:p>
@@ -20204,7 +20204,7 @@
             <a:fld id="{6FCA8E82-58CD-E045-8B98-B7A85B79B752}" type="datetime4">
               <a:rPr lang="en-US" smtClean="0"/>
               <a:pPr/>
-              <a:t>January 2, 2024</a:t>
+              <a:t>January 7, 2024</a:t>
             </a:fld>
             <a:endParaRPr lang="en-US" dirty="0"/>
           </a:p>
@@ -20570,7 +20570,7 @@
             <a:fld id="{6FCA8E82-58CD-E045-8B98-B7A85B79B752}" type="datetime4">
               <a:rPr lang="en-US" smtClean="0"/>
               <a:pPr/>
-              <a:t>January 2, 2024</a:t>
+              <a:t>January 7, 2024</a:t>
             </a:fld>
             <a:endParaRPr lang="en-US" dirty="0"/>
           </a:p>
@@ -21061,7 +21061,7 @@
             <a:fld id="{6FCA8E82-58CD-E045-8B98-B7A85B79B752}" type="datetime4">
               <a:rPr lang="en-US" smtClean="0"/>
               <a:pPr/>
-              <a:t>January 2, 2024</a:t>
+              <a:t>January 7, 2024</a:t>
             </a:fld>
             <a:endParaRPr lang="en-US" dirty="0"/>
           </a:p>
@@ -21497,7 +21497,7 @@
             <a:fld id="{6FCA8E82-58CD-E045-8B98-B7A85B79B752}" type="datetime4">
               <a:rPr lang="en-US" smtClean="0"/>
               <a:pPr/>
-              <a:t>January 2, 2024</a:t>
+              <a:t>January 7, 2024</a:t>
             </a:fld>
             <a:endParaRPr lang="en-US" dirty="0"/>
           </a:p>
@@ -21846,7 +21846,7 @@
             <a:fld id="{6FCA8E82-58CD-E045-8B98-B7A85B79B752}" type="datetime4">
               <a:rPr lang="en-US" smtClean="0"/>
               <a:pPr/>
-              <a:t>January 2, 2024</a:t>
+              <a:t>January 7, 2024</a:t>
             </a:fld>
             <a:endParaRPr lang="en-US" dirty="0"/>
           </a:p>
@@ -22630,7 +22630,7 @@
             <a:fld id="{6FCA8E82-58CD-E045-8B98-B7A85B79B752}" type="datetime4">
               <a:rPr lang="en-US" smtClean="0"/>
               <a:pPr/>
-              <a:t>January 2, 2024</a:t>
+              <a:t>January 7, 2024</a:t>
             </a:fld>
             <a:endParaRPr lang="en-US" dirty="0"/>
           </a:p>
@@ -22947,7 +22947,7 @@
             <a:fld id="{6FCA8E82-58CD-E045-8B98-B7A85B79B752}" type="datetime4">
               <a:rPr lang="en-US" smtClean="0"/>
               <a:pPr/>
-              <a:t>January 2, 2024</a:t>
+              <a:t>January 7, 2024</a:t>
             </a:fld>
             <a:endParaRPr lang="en-US" dirty="0"/>
           </a:p>
@@ -23307,7 +23307,7 @@
             <a:fld id="{6FCA8E82-58CD-E045-8B98-B7A85B79B752}" type="datetime4">
               <a:rPr lang="en-US" smtClean="0"/>
               <a:pPr/>
-              <a:t>January 2, 2024</a:t>
+              <a:t>January 7, 2024</a:t>
             </a:fld>
             <a:endParaRPr lang="en-US" dirty="0"/>
           </a:p>
@@ -23671,7 +23671,7 @@
             <a:fld id="{6FCA8E82-58CD-E045-8B98-B7A85B79B752}" type="datetime4">
               <a:rPr lang="en-US" smtClean="0"/>
               <a:pPr/>
-              <a:t>January 2, 2024</a:t>
+              <a:t>January 7, 2024</a:t>
             </a:fld>
             <a:endParaRPr lang="en-US" dirty="0"/>
           </a:p>
@@ -24041,7 +24041,7 @@
             <a:fld id="{6FCA8E82-58CD-E045-8B98-B7A85B79B752}" type="datetime4">
               <a:rPr lang="en-US" smtClean="0"/>
               <a:pPr/>
-              <a:t>January 2, 2024</a:t>
+              <a:t>January 7, 2024</a:t>
             </a:fld>
             <a:endParaRPr lang="en-US" dirty="0"/>
           </a:p>
@@ -24537,7 +24537,7 @@
             <a:fld id="{6FCA8E82-58CD-E045-8B98-B7A85B79B752}" type="datetime4">
               <a:rPr lang="en-US" smtClean="0"/>
               <a:pPr/>
-              <a:t>January 2, 2024</a:t>
+              <a:t>January 7, 2024</a:t>
             </a:fld>
             <a:endParaRPr lang="en-US" dirty="0"/>
           </a:p>
@@ -24894,7 +24894,7 @@
             <a:fld id="{6FCA8E82-58CD-E045-8B98-B7A85B79B752}" type="datetime4">
               <a:rPr lang="en-US" smtClean="0"/>
               <a:pPr/>
-              <a:t>January 2, 2024</a:t>
+              <a:t>January 7, 2024</a:t>
             </a:fld>
             <a:endParaRPr lang="en-US" dirty="0"/>
           </a:p>
@@ -25183,7 +25183,7 @@
             <a:fld id="{6FCA8E82-58CD-E045-8B98-B7A85B79B752}" type="datetime4">
               <a:rPr lang="en-US" smtClean="0"/>
               <a:pPr/>
-              <a:t>January 2, 2024</a:t>
+              <a:t>January 7, 2024</a:t>
             </a:fld>
             <a:endParaRPr lang="en-US" dirty="0"/>
           </a:p>
@@ -25540,7 +25540,7 @@
             <a:fld id="{6FCA8E82-58CD-E045-8B98-B7A85B79B752}" type="datetime4">
               <a:rPr lang="en-US" smtClean="0"/>
               <a:pPr/>
-              <a:t>January 2, 2024</a:t>
+              <a:t>January 7, 2024</a:t>
             </a:fld>
             <a:endParaRPr lang="en-US" dirty="0"/>
           </a:p>
@@ -25835,7 +25835,7 @@
             <a:fld id="{6FCA8E82-58CD-E045-8B98-B7A85B79B752}" type="datetime4">
               <a:rPr lang="en-US" smtClean="0"/>
               <a:pPr/>
-              <a:t>January 2, 2024</a:t>
+              <a:t>January 7, 2024</a:t>
             </a:fld>
             <a:endParaRPr lang="en-US" dirty="0"/>
           </a:p>
@@ -26313,7 +26313,7 @@
             <a:fld id="{6FCA8E82-58CD-E045-8B98-B7A85B79B752}" type="datetime4">
               <a:rPr lang="en-US" smtClean="0"/>
               <a:pPr/>
-              <a:t>January 2, 2024</a:t>
+              <a:t>January 7, 2024</a:t>
             </a:fld>
             <a:endParaRPr lang="en-US" dirty="0"/>
           </a:p>
@@ -27268,6 +27268,15 @@
 </file>
 
 <file path=customXml/item1.xml><?xml version="1.0" encoding="utf-8"?>
+<?mso-contentType ?>
+<FormTemplates xmlns="http://schemas.microsoft.com/sharepoint/v3/contenttype/forms">
+  <Display>DocumentLibraryForm</Display>
+  <Edit>DocumentLibraryForm</Edit>
+  <New>DocumentLibraryForm</New>
+</FormTemplates>
+</file>
+
+<file path=customXml/item2.xml><?xml version="1.0" encoding="utf-8"?>
 <ct:contentTypeSchema xmlns:ct="http://schemas.microsoft.com/office/2006/metadata/contentType" xmlns:ma="http://schemas.microsoft.com/office/2006/metadata/properties/metaAttributes" ct:_="" ma:_="" ma:contentTypeName="Document" ma:contentTypeID="0x01010079F111ED35F8CC479449609E8A0923A6" ma:contentTypeVersion="28" ma:contentTypeDescription="Create a new document." ma:contentTypeScope="" ma:versionID="60f5a4f2d2b0abadcf532d48ebf9cb71">
   <xsd:schema xmlns:xsd="http://www.w3.org/2001/XMLSchema" xmlns:xs="http://www.w3.org/2001/XMLSchema" xmlns:p="http://schemas.microsoft.com/office/2006/metadata/properties" xmlns:ns1="http://schemas.microsoft.com/sharepoint/v3" xmlns:ns2="71af3243-3dd4-4a8d-8c0d-dd76da1f02a5" xmlns:ns3="16c05727-aa75-4e4a-9b5f-8a80a1165891" xmlns:ns4="230e9df3-be65-4c73-a93b-d1236ebd677e" targetNamespace="http://schemas.microsoft.com/office/2006/metadata/properties" ma:root="true" ma:fieldsID="7dd78129e6a1811f84807ad11c651531" ns1:_="" ns2:_="" ns3:_="" ns4:_="">
     <xsd:import namespace="http://schemas.microsoft.com/sharepoint/v3"/>
@@ -27579,15 +27588,6 @@
 </ct:contentTypeSchema>
 </file>
 
-<file path=customXml/item2.xml><?xml version="1.0" encoding="utf-8"?>
-<?mso-contentType ?>
-<FormTemplates xmlns="http://schemas.microsoft.com/sharepoint/v3/contenttype/forms">
-  <Display>DocumentLibraryForm</Display>
-  <Edit>DocumentLibraryForm</Edit>
-  <New>DocumentLibraryForm</New>
-</FormTemplates>
-</file>
-
 <file path=customXml/item3.xml><?xml version="1.0" encoding="utf-8"?>
 <p:properties xmlns:p="http://schemas.microsoft.com/office/2006/metadata/properties" xmlns:xsi="http://www.w3.org/2001/XMLSchema-instance" xmlns:pc="http://schemas.microsoft.com/office/infopath/2007/PartnerControls">
   <documentManagement>
@@ -27609,6 +27609,14 @@
 </file>
 
 <file path=customXml/itemProps1.xml><?xml version="1.0" encoding="utf-8"?>
+<ds:datastoreItem xmlns:ds="http://schemas.openxmlformats.org/officeDocument/2006/customXml" ds:itemID="{F1446DA3-37A7-4516-A4F6-8B99D0D312BF}">
+  <ds:schemaRefs>
+    <ds:schemaRef ds:uri="http://schemas.microsoft.com/sharepoint/v3/contenttype/forms"/>
+  </ds:schemaRefs>
+</ds:datastoreItem>
+</file>
+
+<file path=customXml/itemProps2.xml><?xml version="1.0" encoding="utf-8"?>
 <ds:datastoreItem xmlns:ds="http://schemas.openxmlformats.org/officeDocument/2006/customXml" ds:itemID="{A6EBEE06-2B28-4E77-9CB6-A74873B39256}">
   <ds:schemaRefs>
     <ds:schemaRef ds:uri="http://schemas.microsoft.com/office/2006/metadata/contentType"/>
@@ -27629,14 +27637,6 @@
 </ds:datastoreItem>
 </file>
 
-<file path=customXml/itemProps2.xml><?xml version="1.0" encoding="utf-8"?>
-<ds:datastoreItem xmlns:ds="http://schemas.openxmlformats.org/officeDocument/2006/customXml" ds:itemID="{F1446DA3-37A7-4516-A4F6-8B99D0D312BF}">
-  <ds:schemaRefs>
-    <ds:schemaRef ds:uri="http://schemas.microsoft.com/sharepoint/v3/contenttype/forms"/>
-  </ds:schemaRefs>
-</ds:datastoreItem>
-</file>
-
 <file path=customXml/itemProps3.xml><?xml version="1.0" encoding="utf-8"?>
 <ds:datastoreItem xmlns:ds="http://schemas.openxmlformats.org/officeDocument/2006/customXml" ds:itemID="{6CC8E66C-AC30-44BA-8882-3290DF968F1F}">
   <ds:schemaRefs>

</xml_diff>